<commit_message>
feat: add presentation slides
</commit_message>
<xml_diff>
--- a/presentation/presentation1.pptx
+++ b/presentation/presentation1.pptx
@@ -6,9 +6,10 @@
   </p:sldMasterIdLst>
   <p:sldIdLst>
     <p:sldId id="256" r:id="rId2"/>
-    <p:sldId id="257" r:id="rId3"/>
-    <p:sldId id="258" r:id="rId4"/>
-    <p:sldId id="259" r:id="rId5"/>
+    <p:sldId id="260" r:id="rId3"/>
+    <p:sldId id="257" r:id="rId4"/>
+    <p:sldId id="258" r:id="rId5"/>
+    <p:sldId id="259" r:id="rId6"/>
   </p:sldIdLst>
   <p:sldSz cx="12192000" cy="6858000"/>
   <p:notesSz cx="6858000" cy="9144000"/>
@@ -107,6 +108,11 @@
       </a:defRPr>
     </a:lvl9pPr>
   </p:defaultTextStyle>
+  <p:extLst>
+    <p:ext uri="{EFAFB233-063F-42B5-8137-9DF3F51BA10A}">
+      <p15:sldGuideLst xmlns:p15="http://schemas.microsoft.com/office/powerpoint/2012/main"/>
+    </p:ext>
+  </p:extLst>
 </p:presentation>
 </file>
 
@@ -3459,6 +3465,95 @@
           <p:cNvPr id="2" name="Title 1">
             <a:extLst>
               <a:ext uri="{FF2B5EF4-FFF2-40B4-BE49-F238E27FC236}">
+                <a16:creationId xmlns:a16="http://schemas.microsoft.com/office/drawing/2014/main" id="{74D1B7EA-5D93-AD3F-6957-A8B679AEBB62}"/>
+              </a:ext>
+            </a:extLst>
+          </p:cNvPr>
+          <p:cNvSpPr>
+            <a:spLocks noGrp="1"/>
+          </p:cNvSpPr>
+          <p:nvPr>
+            <p:ph type="title"/>
+          </p:nvPr>
+        </p:nvSpPr>
+        <p:spPr/>
+        <p:txBody>
+          <a:bodyPr/>
+          <a:lstStyle/>
+          <a:p>
+            <a:r>
+              <a:rPr lang="en-US" dirty="0" err="1"/>
+              <a:t>MileStones</a:t>
+            </a:r>
+            <a:endParaRPr lang="en-US" dirty="0"/>
+          </a:p>
+        </p:txBody>
+      </p:sp>
+      <p:pic>
+        <p:nvPicPr>
+          <p:cNvPr id="4" name="Picture 3">
+            <a:extLst>
+              <a:ext uri="{FF2B5EF4-FFF2-40B4-BE49-F238E27FC236}">
+                <a16:creationId xmlns:a16="http://schemas.microsoft.com/office/drawing/2014/main" id="{6FC0A187-E970-660A-5806-169B28E25C9E}"/>
+              </a:ext>
+            </a:extLst>
+          </p:cNvPr>
+          <p:cNvPicPr>
+            <a:picLocks noChangeAspect="1"/>
+          </p:cNvPicPr>
+          <p:nvPr/>
+        </p:nvPicPr>
+        <p:blipFill>
+          <a:blip r:embed="rId2"/>
+          <a:stretch>
+            <a:fillRect/>
+          </a:stretch>
+        </p:blipFill>
+        <p:spPr>
+          <a:xfrm>
+            <a:off x="948560" y="1400588"/>
+            <a:ext cx="8805040" cy="5396637"/>
+          </a:xfrm>
+          <a:prstGeom prst="rect">
+            <a:avLst/>
+          </a:prstGeom>
+        </p:spPr>
+      </p:pic>
+    </p:spTree>
+    <p:extLst>
+      <p:ext uri="{BB962C8B-B14F-4D97-AF65-F5344CB8AC3E}">
+        <p14:creationId xmlns:p14="http://schemas.microsoft.com/office/powerpoint/2010/main" val="1598838716"/>
+      </p:ext>
+    </p:extLst>
+  </p:cSld>
+  <p:clrMapOvr>
+    <a:masterClrMapping/>
+  </p:clrMapOvr>
+</p:sld>
+</file>
+
+<file path=ppt/slides/slide3.xml><?xml version="1.0" encoding="utf-8"?>
+<p:sld xmlns:a="http://schemas.openxmlformats.org/drawingml/2006/main" xmlns:r="http://schemas.openxmlformats.org/officeDocument/2006/relationships" xmlns:p="http://schemas.openxmlformats.org/presentationml/2006/main">
+  <p:cSld>
+    <p:spTree>
+      <p:nvGrpSpPr>
+        <p:cNvPr id="1" name=""/>
+        <p:cNvGrpSpPr/>
+        <p:nvPr/>
+      </p:nvGrpSpPr>
+      <p:grpSpPr>
+        <a:xfrm>
+          <a:off x="0" y="0"/>
+          <a:ext cx="0" cy="0"/>
+          <a:chOff x="0" y="0"/>
+          <a:chExt cx="0" cy="0"/>
+        </a:xfrm>
+      </p:grpSpPr>
+      <p:sp>
+        <p:nvSpPr>
+          <p:cNvPr id="2" name="Title 1">
+            <a:extLst>
+              <a:ext uri="{FF2B5EF4-FFF2-40B4-BE49-F238E27FC236}">
                 <a16:creationId xmlns:a16="http://schemas.microsoft.com/office/drawing/2014/main" id="{0B121ECF-6EE6-CB17-17CA-238B35D96EE2}"/>
               </a:ext>
             </a:extLst>
@@ -3584,7 +3679,7 @@
 </p:sld>
 </file>
 
-<file path=ppt/slides/slide3.xml><?xml version="1.0" encoding="utf-8"?>
+<file path=ppt/slides/slide4.xml><?xml version="1.0" encoding="utf-8"?>
 <p:sld xmlns:a="http://schemas.openxmlformats.org/drawingml/2006/main" xmlns:r="http://schemas.openxmlformats.org/officeDocument/2006/relationships" xmlns:p="http://schemas.openxmlformats.org/presentationml/2006/main">
   <p:cSld>
     <p:spTree>
@@ -3689,7 +3784,7 @@
 </p:sld>
 </file>
 
-<file path=ppt/slides/slide4.xml><?xml version="1.0" encoding="utf-8"?>
+<file path=ppt/slides/slide5.xml><?xml version="1.0" encoding="utf-8"?>
 <p:sld xmlns:a="http://schemas.openxmlformats.org/drawingml/2006/main" xmlns:r="http://schemas.openxmlformats.org/officeDocument/2006/relationships" xmlns:p="http://schemas.openxmlformats.org/presentationml/2006/main">
   <p:cSld>
     <p:spTree>

</xml_diff>